<commit_message>
docs: update setup guide presentation
</commit_message>
<xml_diff>
--- a/reference/Raspiセットアップガイド.pptx
+++ b/reference/Raspiセットアップガイド.pptx
@@ -5,7 +5,7 @@
     <p:sldMasterId id="2147483648" r:id="rId4"/>
   </p:sldMasterIdLst>
   <p:notesMasterIdLst>
-    <p:notesMasterId r:id="rId25"/>
+    <p:notesMasterId r:id="rId27"/>
   </p:notesMasterIdLst>
   <p:sldIdLst>
     <p:sldId id="306" r:id="rId5"/>
@@ -17,19 +17,19 @@
     <p:sldId id="272" r:id="rId11"/>
     <p:sldId id="273" r:id="rId12"/>
     <p:sldId id="274" r:id="rId13"/>
-    <p:sldId id="321" r:id="rId14"/>
+    <p:sldId id="329" r:id="rId14"/>
     <p:sldId id="278" r:id="rId15"/>
     <p:sldId id="277" r:id="rId16"/>
     <p:sldId id="262" r:id="rId17"/>
     <p:sldId id="265" r:id="rId18"/>
-    <p:sldId id="283" r:id="rId19"/>
+    <p:sldId id="328" r:id="rId19"/>
     <p:sldId id="312" r:id="rId20"/>
     <p:sldId id="314" r:id="rId21"/>
     <p:sldId id="297" r:id="rId22"/>
     <p:sldId id="322" r:id="rId23"/>
     <p:sldId id="318" r:id="rId24"/>
-    <p:sldId id="324" r:id="rId32"/>
-    <p:sldId id="325" r:id="rId33"/>
+    <p:sldId id="324" r:id="rId25"/>
+    <p:sldId id="325" r:id="rId26"/>
   </p:sldIdLst>
   <p:sldSz cx="9144000" cy="5143500" type="screen16x9"/>
   <p:notesSz cx="5143500" cy="9144000"/>
@@ -233,114 +233,6 @@
             <ac:picMk id="23" creationId="{54212725-DCE1-F196-F0A4-38DEB2A6E0D9}"/>
           </ac:picMkLst>
         </pc:picChg>
-      </pc:sldChg>
-    </pc:docChg>
-  </pc:docChgLst>
-  <pc:docChgLst>
-    <pc:chgData name="Go Muto" userId="S::go_muto@gmsbiz.net::0ea32aeb-8bc2-4177-b806-bfac87ba8199" providerId="AD" clId="Web-{ACDB0AD3-46F1-9660-0308-F442A077C455}"/>
-    <pc:docChg chg="addSld delSld modSld sldOrd">
-      <pc:chgData name="Go Muto" userId="S::go_muto@gmsbiz.net::0ea32aeb-8bc2-4177-b806-bfac87ba8199" providerId="AD" clId="Web-{ACDB0AD3-46F1-9660-0308-F442A077C455}" dt="2026-02-11T05:37:53.093" v="12"/>
-      <pc:docMkLst>
-        <pc:docMk/>
-      </pc:docMkLst>
-      <pc:sldChg chg="addSp modSp add del">
-        <pc:chgData name="Go Muto" userId="S::go_muto@gmsbiz.net::0ea32aeb-8bc2-4177-b806-bfac87ba8199" providerId="AD" clId="Web-{ACDB0AD3-46F1-9660-0308-F442A077C455}" dt="2026-02-11T05:37:53.093" v="12"/>
-        <pc:sldMkLst>
-          <pc:docMk/>
-          <pc:sldMk cId="0" sldId="262"/>
-        </pc:sldMkLst>
-        <pc:picChg chg="add mod">
-          <ac:chgData name="Go Muto" userId="S::go_muto@gmsbiz.net::0ea32aeb-8bc2-4177-b806-bfac87ba8199" providerId="AD" clId="Web-{ACDB0AD3-46F1-9660-0308-F442A077C455}" dt="2026-02-11T05:37:10.717" v="7" actId="14100"/>
-          <ac:picMkLst>
-            <pc:docMk/>
-            <pc:sldMk cId="0" sldId="262"/>
-            <ac:picMk id="23" creationId="{0A7FAD56-A7AC-4108-9E57-CF57B911F08B}"/>
-          </ac:picMkLst>
-        </pc:picChg>
-      </pc:sldChg>
-      <pc:sldChg chg="add del">
-        <pc:chgData name="Go Muto" userId="S::go_muto@gmsbiz.net::0ea32aeb-8bc2-4177-b806-bfac87ba8199" providerId="AD" clId="Web-{ACDB0AD3-46F1-9660-0308-F442A077C455}" dt="2026-02-11T05:37:51.374" v="11"/>
-        <pc:sldMkLst>
-          <pc:docMk/>
-          <pc:sldMk cId="0" sldId="265"/>
-        </pc:sldMkLst>
-      </pc:sldChg>
-      <pc:sldChg chg="delSp add ord replId">
-        <pc:chgData name="Go Muto" userId="S::go_muto@gmsbiz.net::0ea32aeb-8bc2-4177-b806-bfac87ba8199" providerId="AD" clId="Web-{ACDB0AD3-46F1-9660-0308-F442A077C455}" dt="2026-02-11T05:24:34.186" v="4"/>
-        <pc:sldMkLst>
-          <pc:docMk/>
-          <pc:sldMk cId="2025493674" sldId="271"/>
-        </pc:sldMkLst>
-      </pc:sldChg>
-    </pc:docChg>
-  </pc:docChgLst>
-  <pc:docChgLst>
-    <pc:chgData name="Go Muto" userId="S::go_muto@gmsbiz.net::0ea32aeb-8bc2-4177-b806-bfac87ba8199" providerId="AD" clId="Web-{E2776F8D-D6C6-1B4B-16F8-95A28AB1FE6E}"/>
-    <pc:docChg chg="addSld modSld">
-      <pc:chgData name="Go Muto" userId="S::go_muto@gmsbiz.net::0ea32aeb-8bc2-4177-b806-bfac87ba8199" providerId="AD" clId="Web-{E2776F8D-D6C6-1B4B-16F8-95A28AB1FE6E}" dt="2026-02-12T01:03:05.837" v="50" actId="1076"/>
-      <pc:docMkLst>
-        <pc:docMk/>
-      </pc:docMkLst>
-      <pc:sldChg chg="modSp">
-        <pc:chgData name="Go Muto" userId="S::go_muto@gmsbiz.net::0ea32aeb-8bc2-4177-b806-bfac87ba8199" providerId="AD" clId="Web-{E2776F8D-D6C6-1B4B-16F8-95A28AB1FE6E}" dt="2026-02-12T01:00:44.904" v="9" actId="20577"/>
-        <pc:sldMkLst>
-          <pc:docMk/>
-          <pc:sldMk cId="0" sldId="262"/>
-        </pc:sldMkLst>
-        <pc:spChg chg="mod">
-          <ac:chgData name="Go Muto" userId="S::go_muto@gmsbiz.net::0ea32aeb-8bc2-4177-b806-bfac87ba8199" providerId="AD" clId="Web-{E2776F8D-D6C6-1B4B-16F8-95A28AB1FE6E}" dt="2026-02-12T01:00:44.904" v="9" actId="20577"/>
-          <ac:spMkLst>
-            <pc:docMk/>
-            <pc:sldMk cId="0" sldId="262"/>
-            <ac:spMk id="3" creationId="{00000000-0000-0000-0000-000000000000}"/>
-          </ac:spMkLst>
-        </pc:spChg>
-      </pc:sldChg>
-      <pc:sldChg chg="modSp">
-        <pc:chgData name="Go Muto" userId="S::go_muto@gmsbiz.net::0ea32aeb-8bc2-4177-b806-bfac87ba8199" providerId="AD" clId="Web-{E2776F8D-D6C6-1B4B-16F8-95A28AB1FE6E}" dt="2026-02-12T01:00:42.294" v="7" actId="20577"/>
-        <pc:sldMkLst>
-          <pc:docMk/>
-          <pc:sldMk cId="3618399124" sldId="277"/>
-        </pc:sldMkLst>
-        <pc:spChg chg="mod">
-          <ac:chgData name="Go Muto" userId="S::go_muto@gmsbiz.net::0ea32aeb-8bc2-4177-b806-bfac87ba8199" providerId="AD" clId="Web-{E2776F8D-D6C6-1B4B-16F8-95A28AB1FE6E}" dt="2026-02-12T01:00:42.294" v="7" actId="20577"/>
-          <ac:spMkLst>
-            <pc:docMk/>
-            <pc:sldMk cId="3618399124" sldId="277"/>
-            <ac:spMk id="3" creationId="{20BFD28A-6584-AA06-7BBE-DA037E389CC5}"/>
-          </ac:spMkLst>
-        </pc:spChg>
-      </pc:sldChg>
-      <pc:sldChg chg="modSp add replId">
-        <pc:chgData name="Go Muto" userId="S::go_muto@gmsbiz.net::0ea32aeb-8bc2-4177-b806-bfac87ba8199" providerId="AD" clId="Web-{E2776F8D-D6C6-1B4B-16F8-95A28AB1FE6E}" dt="2026-02-12T01:01:46.206" v="21" actId="20577"/>
-        <pc:sldMkLst>
-          <pc:docMk/>
-          <pc:sldMk cId="2653292976" sldId="278"/>
-        </pc:sldMkLst>
-        <pc:spChg chg="mod">
-          <ac:chgData name="Go Muto" userId="S::go_muto@gmsbiz.net::0ea32aeb-8bc2-4177-b806-bfac87ba8199" providerId="AD" clId="Web-{E2776F8D-D6C6-1B4B-16F8-95A28AB1FE6E}" dt="2026-02-12T01:00:37.981" v="5" actId="20577"/>
-          <ac:spMkLst>
-            <pc:docMk/>
-            <pc:sldMk cId="2653292976" sldId="278"/>
-            <ac:spMk id="3" creationId="{B4D2C661-FE61-7375-A24B-73C5B04570BE}"/>
-          </ac:spMkLst>
-        </pc:spChg>
-        <pc:spChg chg="mod">
-          <ac:chgData name="Go Muto" userId="S::go_muto@gmsbiz.net::0ea32aeb-8bc2-4177-b806-bfac87ba8199" providerId="AD" clId="Web-{E2776F8D-D6C6-1B4B-16F8-95A28AB1FE6E}" dt="2026-02-12T01:01:25.080" v="19" actId="20577"/>
-          <ac:spMkLst>
-            <pc:docMk/>
-            <pc:sldMk cId="2653292976" sldId="278"/>
-            <ac:spMk id="4" creationId="{88A5B7E6-A500-B090-D068-BEC4A1B50D11}"/>
-          </ac:spMkLst>
-        </pc:spChg>
-        <pc:spChg chg="mod">
-          <ac:chgData name="Go Muto" userId="S::go_muto@gmsbiz.net::0ea32aeb-8bc2-4177-b806-bfac87ba8199" providerId="AD" clId="Web-{E2776F8D-D6C6-1B4B-16F8-95A28AB1FE6E}" dt="2026-02-12T01:01:46.206" v="21" actId="20577"/>
-          <ac:spMkLst>
-            <pc:docMk/>
-            <pc:sldMk cId="2653292976" sldId="278"/>
-            <ac:spMk id="25" creationId="{283D74A9-1DE6-F06F-7C6E-189A4058E619}"/>
-          </ac:spMkLst>
-        </pc:spChg>
       </pc:sldChg>
     </pc:docChg>
   </pc:docChgLst>
@@ -868,12 +760,111 @@
     </pc:docChg>
   </pc:docChgLst>
   <pc:docChgLst>
-    <pc:chgData name="Go Muto" userId="S::go_muto@gmsbiz.net::0ea32aeb-8bc2-4177-b806-bfac87ba8199" providerId="AD" clId="Web-{E1B98E4B-AE9E-2B87-8E53-881D23407F18}"/>
-    <pc:docChg chg="addSld delSld modSld">
-      <pc:chgData name="Go Muto" userId="S::go_muto@gmsbiz.net::0ea32aeb-8bc2-4177-b806-bfac87ba8199" providerId="AD" clId="Web-{E1B98E4B-AE9E-2B87-8E53-881D23407F18}" dt="2026-02-06T09:02:20.319" v="44" actId="1076"/>
+    <pc:chgData name="Go Muto" userId="S::go_muto@gmsbiz.net::0ea32aeb-8bc2-4177-b806-bfac87ba8199" providerId="AD" clId="Web-{ACDB0AD3-46F1-9660-0308-F442A077C455}"/>
+    <pc:docChg chg="addSld delSld modSld sldOrd">
+      <pc:chgData name="Go Muto" userId="S::go_muto@gmsbiz.net::0ea32aeb-8bc2-4177-b806-bfac87ba8199" providerId="AD" clId="Web-{ACDB0AD3-46F1-9660-0308-F442A077C455}" dt="2026-02-11T05:37:53.093" v="12"/>
       <pc:docMkLst>
         <pc:docMk/>
       </pc:docMkLst>
+      <pc:sldChg chg="addSp modSp add del">
+        <pc:chgData name="Go Muto" userId="S::go_muto@gmsbiz.net::0ea32aeb-8bc2-4177-b806-bfac87ba8199" providerId="AD" clId="Web-{ACDB0AD3-46F1-9660-0308-F442A077C455}" dt="2026-02-11T05:37:53.093" v="12"/>
+        <pc:sldMkLst>
+          <pc:docMk/>
+          <pc:sldMk cId="0" sldId="262"/>
+        </pc:sldMkLst>
+        <pc:picChg chg="add mod">
+          <ac:chgData name="Go Muto" userId="S::go_muto@gmsbiz.net::0ea32aeb-8bc2-4177-b806-bfac87ba8199" providerId="AD" clId="Web-{ACDB0AD3-46F1-9660-0308-F442A077C455}" dt="2026-02-11T05:37:10.717" v="7" actId="14100"/>
+          <ac:picMkLst>
+            <pc:docMk/>
+            <pc:sldMk cId="0" sldId="262"/>
+            <ac:picMk id="23" creationId="{0A7FAD56-A7AC-4108-9E57-CF57B911F08B}"/>
+          </ac:picMkLst>
+        </pc:picChg>
+      </pc:sldChg>
+      <pc:sldChg chg="add del">
+        <pc:chgData name="Go Muto" userId="S::go_muto@gmsbiz.net::0ea32aeb-8bc2-4177-b806-bfac87ba8199" providerId="AD" clId="Web-{ACDB0AD3-46F1-9660-0308-F442A077C455}" dt="2026-02-11T05:37:51.374" v="11"/>
+        <pc:sldMkLst>
+          <pc:docMk/>
+          <pc:sldMk cId="0" sldId="265"/>
+        </pc:sldMkLst>
+      </pc:sldChg>
+      <pc:sldChg chg="delSp add ord replId">
+        <pc:chgData name="Go Muto" userId="S::go_muto@gmsbiz.net::0ea32aeb-8bc2-4177-b806-bfac87ba8199" providerId="AD" clId="Web-{ACDB0AD3-46F1-9660-0308-F442A077C455}" dt="2026-02-11T05:24:34.186" v="4"/>
+        <pc:sldMkLst>
+          <pc:docMk/>
+          <pc:sldMk cId="2025493674" sldId="271"/>
+        </pc:sldMkLst>
+      </pc:sldChg>
+    </pc:docChg>
+  </pc:docChgLst>
+  <pc:docChgLst>
+    <pc:chgData name="Go Muto" userId="S::go_muto@gmsbiz.net::0ea32aeb-8bc2-4177-b806-bfac87ba8199" providerId="AD" clId="Web-{E2776F8D-D6C6-1B4B-16F8-95A28AB1FE6E}"/>
+    <pc:docChg chg="addSld modSld">
+      <pc:chgData name="Go Muto" userId="S::go_muto@gmsbiz.net::0ea32aeb-8bc2-4177-b806-bfac87ba8199" providerId="AD" clId="Web-{E2776F8D-D6C6-1B4B-16F8-95A28AB1FE6E}" dt="2026-02-12T01:03:05.837" v="50" actId="1076"/>
+      <pc:docMkLst>
+        <pc:docMk/>
+      </pc:docMkLst>
+      <pc:sldChg chg="modSp">
+        <pc:chgData name="Go Muto" userId="S::go_muto@gmsbiz.net::0ea32aeb-8bc2-4177-b806-bfac87ba8199" providerId="AD" clId="Web-{E2776F8D-D6C6-1B4B-16F8-95A28AB1FE6E}" dt="2026-02-12T01:00:44.904" v="9" actId="20577"/>
+        <pc:sldMkLst>
+          <pc:docMk/>
+          <pc:sldMk cId="0" sldId="262"/>
+        </pc:sldMkLst>
+        <pc:spChg chg="mod">
+          <ac:chgData name="Go Muto" userId="S::go_muto@gmsbiz.net::0ea32aeb-8bc2-4177-b806-bfac87ba8199" providerId="AD" clId="Web-{E2776F8D-D6C6-1B4B-16F8-95A28AB1FE6E}" dt="2026-02-12T01:00:44.904" v="9" actId="20577"/>
+          <ac:spMkLst>
+            <pc:docMk/>
+            <pc:sldMk cId="0" sldId="262"/>
+            <ac:spMk id="3" creationId="{00000000-0000-0000-0000-000000000000}"/>
+          </ac:spMkLst>
+        </pc:spChg>
+      </pc:sldChg>
+      <pc:sldChg chg="modSp">
+        <pc:chgData name="Go Muto" userId="S::go_muto@gmsbiz.net::0ea32aeb-8bc2-4177-b806-bfac87ba8199" providerId="AD" clId="Web-{E2776F8D-D6C6-1B4B-16F8-95A28AB1FE6E}" dt="2026-02-12T01:00:42.294" v="7" actId="20577"/>
+        <pc:sldMkLst>
+          <pc:docMk/>
+          <pc:sldMk cId="3618399124" sldId="277"/>
+        </pc:sldMkLst>
+        <pc:spChg chg="mod">
+          <ac:chgData name="Go Muto" userId="S::go_muto@gmsbiz.net::0ea32aeb-8bc2-4177-b806-bfac87ba8199" providerId="AD" clId="Web-{E2776F8D-D6C6-1B4B-16F8-95A28AB1FE6E}" dt="2026-02-12T01:00:42.294" v="7" actId="20577"/>
+          <ac:spMkLst>
+            <pc:docMk/>
+            <pc:sldMk cId="3618399124" sldId="277"/>
+            <ac:spMk id="3" creationId="{20BFD28A-6584-AA06-7BBE-DA037E389CC5}"/>
+          </ac:spMkLst>
+        </pc:spChg>
+      </pc:sldChg>
+      <pc:sldChg chg="modSp add replId">
+        <pc:chgData name="Go Muto" userId="S::go_muto@gmsbiz.net::0ea32aeb-8bc2-4177-b806-bfac87ba8199" providerId="AD" clId="Web-{E2776F8D-D6C6-1B4B-16F8-95A28AB1FE6E}" dt="2026-02-12T01:01:46.206" v="21" actId="20577"/>
+        <pc:sldMkLst>
+          <pc:docMk/>
+          <pc:sldMk cId="2653292976" sldId="278"/>
+        </pc:sldMkLst>
+        <pc:spChg chg="mod">
+          <ac:chgData name="Go Muto" userId="S::go_muto@gmsbiz.net::0ea32aeb-8bc2-4177-b806-bfac87ba8199" providerId="AD" clId="Web-{E2776F8D-D6C6-1B4B-16F8-95A28AB1FE6E}" dt="2026-02-12T01:00:37.981" v="5" actId="20577"/>
+          <ac:spMkLst>
+            <pc:docMk/>
+            <pc:sldMk cId="2653292976" sldId="278"/>
+            <ac:spMk id="3" creationId="{B4D2C661-FE61-7375-A24B-73C5B04570BE}"/>
+          </ac:spMkLst>
+        </pc:spChg>
+        <pc:spChg chg="mod">
+          <ac:chgData name="Go Muto" userId="S::go_muto@gmsbiz.net::0ea32aeb-8bc2-4177-b806-bfac87ba8199" providerId="AD" clId="Web-{E2776F8D-D6C6-1B4B-16F8-95A28AB1FE6E}" dt="2026-02-12T01:01:25.080" v="19" actId="20577"/>
+          <ac:spMkLst>
+            <pc:docMk/>
+            <pc:sldMk cId="2653292976" sldId="278"/>
+            <ac:spMk id="4" creationId="{88A5B7E6-A500-B090-D068-BEC4A1B50D11}"/>
+          </ac:spMkLst>
+        </pc:spChg>
+        <pc:spChg chg="mod">
+          <ac:chgData name="Go Muto" userId="S::go_muto@gmsbiz.net::0ea32aeb-8bc2-4177-b806-bfac87ba8199" providerId="AD" clId="Web-{E2776F8D-D6C6-1B4B-16F8-95A28AB1FE6E}" dt="2026-02-12T01:01:46.206" v="21" actId="20577"/>
+          <ac:spMkLst>
+            <pc:docMk/>
+            <pc:sldMk cId="2653292976" sldId="278"/>
+            <ac:spMk id="25" creationId="{283D74A9-1DE6-F06F-7C6E-189A4058E619}"/>
+          </ac:spMkLst>
+        </pc:spChg>
+      </pc:sldChg>
     </pc:docChg>
   </pc:docChgLst>
   <pc:docChgLst>
@@ -1554,6 +1545,15 @@
       </pc:sldChg>
     </pc:docChg>
   </pc:docChgLst>
+  <pc:docChgLst>
+    <pc:chgData name="Go Muto" userId="S::go_muto@gmsbiz.net::0ea32aeb-8bc2-4177-b806-bfac87ba8199" providerId="AD" clId="Web-{E1B98E4B-AE9E-2B87-8E53-881D23407F18}"/>
+    <pc:docChg chg="addSld delSld modSld">
+      <pc:chgData name="Go Muto" userId="S::go_muto@gmsbiz.net::0ea32aeb-8bc2-4177-b806-bfac87ba8199" providerId="AD" clId="Web-{E1B98E4B-AE9E-2B87-8E53-881D23407F18}" dt="2026-02-06T09:02:20.319" v="44" actId="1076"/>
+      <pc:docMkLst>
+        <pc:docMk/>
+      </pc:docMkLst>
+    </pc:docChg>
+  </pc:docChgLst>
 </pc:chgInfo>
 </file>
 
@@ -5409,7 +5409,7 @@
         <p:spPr>
           <a:xfrm>
             <a:off x="860903" y="1296052"/>
-            <a:ext cx="3337465" cy="734644"/>
+            <a:ext cx="3337465" cy="1321580"/>
           </a:xfrm>
           <a:prstGeom prst="rect">
             <a:avLst/>
@@ -5418,7 +5418,9 @@
           <a:ln/>
         </p:spPr>
         <p:txBody>
-          <a:bodyPr wrap="square" lIns="0" tIns="0" rIns="0" bIns="0" rtlCol="0" anchor="t"/>
+          <a:bodyPr wrap="square" lIns="0" tIns="0" rIns="0" bIns="0" rtlCol="0" anchor="t">
+            <a:spAutoFit/>
+          </a:bodyPr>
           <a:lstStyle/>
           <a:p>
             <a:pPr marL="0" indent="0" algn="l">
@@ -5442,10 +5444,24 @@
                 <a:ea typeface="Arial" pitchFamily="34" charset="-122"/>
                 <a:cs typeface="Arial"/>
               </a:rPr>
-              <a:t>使う場合は、「SSHを有効化する」のスイッチを右にスライドして、右下の</a:t>
-            </a:r>
-            <a:r>
-              <a:rPr lang="en-US" sz="1050" b="1">
+              <a:t>使う場合は、「SSHを有効化する」のスイッチを右にスライド</a:t>
+            </a:r>
+          </a:p>
+          <a:p>
+            <a:pPr marL="0" indent="0" algn="l">
+              <a:lnSpc>
+                <a:spcPts val="1470"/>
+              </a:lnSpc>
+              <a:spcBef>
+                <a:spcPts val="100"/>
+              </a:spcBef>
+              <a:spcAft>
+                <a:spcPts val="300"/>
+              </a:spcAft>
+              <a:buNone/>
+            </a:pPr>
+            <a:r>
+              <a:rPr lang="ja-JP" altLang="en-US" sz="1050">
                 <a:solidFill>
                   <a:srgbClr val="1D1D1D"/>
                 </a:solidFill>
@@ -5453,21 +5469,21 @@
                 <a:ea typeface="Arial" pitchFamily="34" charset="-122"/>
                 <a:cs typeface="Arial"/>
               </a:rPr>
-              <a:t>「</a:t>
-            </a:r>
-            <a:r>
-              <a:rPr lang="ja-JP" altLang="en-US" sz="1050" b="1">
-                <a:solidFill>
-                  <a:srgbClr val="1D1D1D"/>
+              <a:t>→ 「</a:t>
+            </a:r>
+            <a:r>
+              <a:rPr lang="en-US" sz="1050" b="1" dirty="0">
+                <a:solidFill>
+                  <a:srgbClr val="C51A4A"/>
                 </a:solidFill>
                 <a:latin typeface="Arial"/>
                 <a:ea typeface="Arial" pitchFamily="34" charset="-122"/>
                 <a:cs typeface="Arial"/>
               </a:rPr>
-              <a:t>次へ</a:t>
-            </a:r>
-            <a:r>
-              <a:rPr lang="en-US" sz="1050" b="1">
+              <a:t>Authentication mechanism</a:t>
+            </a:r>
+            <a:r>
+              <a:rPr lang="ja-JP" altLang="en-US" sz="1050">
                 <a:solidFill>
                   <a:srgbClr val="1D1D1D"/>
                 </a:solidFill>
@@ -5475,7 +5491,54 @@
                 <a:ea typeface="Arial" pitchFamily="34" charset="-122"/>
                 <a:cs typeface="Arial"/>
               </a:rPr>
-              <a:t>」をクリック</a:t>
+              <a:t>」の選択項目が表示されるので、「</a:t>
+            </a:r>
+            <a:r>
+              <a:rPr lang="ja-JP" altLang="en-US" sz="1050" b="1">
+                <a:solidFill>
+                  <a:srgbClr val="1D1D1D"/>
+                </a:solidFill>
+                <a:latin typeface="Arial"/>
+                <a:ea typeface="Arial" pitchFamily="34" charset="-122"/>
+                <a:cs typeface="Arial"/>
+              </a:rPr>
+              <a:t>パスワード認証を使う</a:t>
+            </a:r>
+            <a:r>
+              <a:rPr lang="ja-JP" altLang="en-US" sz="1050">
+                <a:solidFill>
+                  <a:srgbClr val="1D1D1D"/>
+                </a:solidFill>
+                <a:latin typeface="Arial"/>
+                <a:ea typeface="Arial" pitchFamily="34" charset="-122"/>
+                <a:cs typeface="Arial"/>
+              </a:rPr>
+              <a:t>」を選択</a:t>
+            </a:r>
+          </a:p>
+          <a:p>
+            <a:pPr marL="0" indent="0" algn="l">
+              <a:lnSpc>
+                <a:spcPts val="1470"/>
+              </a:lnSpc>
+              <a:spcBef>
+                <a:spcPts val="100"/>
+              </a:spcBef>
+              <a:spcAft>
+                <a:spcPts val="300"/>
+              </a:spcAft>
+              <a:buNone/>
+            </a:pPr>
+            <a:r>
+              <a:rPr lang="ja-JP" altLang="en-US" sz="1050" b="1">
+                <a:solidFill>
+                  <a:srgbClr val="1D1D1D"/>
+                </a:solidFill>
+                <a:latin typeface="Arial"/>
+                <a:ea typeface="Arial" pitchFamily="34" charset="-122"/>
+                <a:cs typeface="Arial"/>
+              </a:rPr>
+              <a:t>右下の「次へ」をクリック</a:t>
             </a:r>
           </a:p>
           <a:p>
@@ -5499,53 +5562,9 @@
                 <a:ea typeface="游ゴシック"/>
                 <a:cs typeface="Arial"/>
               </a:rPr>
-              <a:t>使わない場合は、そのまま</a:t>
-            </a:r>
-            <a:r>
-              <a:rPr lang="ja-JP" sz="1100" b="1">
-                <a:solidFill>
-                  <a:srgbClr val="1D1D1D"/>
-                </a:solidFill>
-                <a:latin typeface="Arial"/>
-                <a:ea typeface="游ゴシック"/>
-                <a:cs typeface="Arial"/>
-              </a:rPr>
-              <a:t>右下の</a:t>
-            </a:r>
-            <a:r>
-              <a:rPr lang="ja-JP" altLang="en-US" sz="1100" b="1">
-                <a:solidFill>
-                  <a:srgbClr val="1D1D1D"/>
-                </a:solidFill>
-                <a:latin typeface="Arial"/>
-                <a:ea typeface="+mn-lt"/>
-                <a:cs typeface="Arial"/>
-              </a:rPr>
-              <a:t>「</a:t>
-            </a:r>
-            <a:r>
-              <a:rPr lang="ja-JP" sz="1100" b="1">
-                <a:solidFill>
-                  <a:srgbClr val="1D1D1D"/>
-                </a:solidFill>
-                <a:latin typeface="Arial"/>
-                <a:ea typeface="游ゴシック"/>
-                <a:cs typeface="Arial"/>
-              </a:rPr>
-              <a:t>次へ</a:t>
-            </a:r>
-            <a:r>
-              <a:rPr lang="ja-JP" altLang="en-US" sz="1100" b="1">
-                <a:solidFill>
-                  <a:srgbClr val="1D1D1D"/>
-                </a:solidFill>
-                <a:latin typeface="Arial"/>
-                <a:ea typeface="+mn-lt"/>
-                <a:cs typeface="Arial"/>
-              </a:rPr>
-              <a:t>」をクリック</a:t>
-            </a:r>
-            <a:endParaRPr lang="ja-JP" sz="1100">
+              <a:t>使わない場合は、そのまま右下の「次へ」をクリック</a:t>
+            </a:r>
+            <a:endParaRPr lang="ja-JP" sz="1050">
               <a:solidFill>
                 <a:srgbClr val="000000"/>
               </a:solidFill>
@@ -5554,27 +5573,6 @@
               <a:cs typeface="Arial"/>
             </a:endParaRPr>
           </a:p>
-          <a:p>
-            <a:pPr>
-              <a:lnSpc>
-                <a:spcPts val="1470"/>
-              </a:lnSpc>
-              <a:spcBef>
-                <a:spcPts val="300"/>
-              </a:spcBef>
-              <a:spcAft>
-                <a:spcPts val="300"/>
-              </a:spcAft>
-            </a:pPr>
-            <a:endParaRPr lang="ja-JP" altLang="en-US" sz="1050" b="1" dirty="0">
-              <a:solidFill>
-                <a:srgbClr val="1D1D1D"/>
-              </a:solidFill>
-              <a:latin typeface="Arial"/>
-              <a:ea typeface="游ゴシック"/>
-              <a:cs typeface="Arial"/>
-            </a:endParaRPr>
-          </a:p>
         </p:txBody>
       </p:sp>
       <p:sp>
@@ -5585,8 +5583,8 @@
         </p:nvSpPr>
         <p:spPr>
           <a:xfrm>
-            <a:off x="457200" y="2438400"/>
-            <a:ext cx="3962400" cy="2133600"/>
+            <a:off x="457200" y="2692400"/>
+            <a:ext cx="3962400" cy="2222500"/>
           </a:xfrm>
           <a:prstGeom prst="roundRect">
             <a:avLst>
@@ -5661,7 +5659,7 @@
                 <a:latin typeface="Arial"/>
                 <a:cs typeface="Arial"/>
               </a:rPr>
-              <a:t xml:space="preserve">SSH (Secure Shell) </a:t>
+              <a:t>SSH (Secure Shell) </a:t>
             </a:r>
             <a:r>
               <a:rPr lang="ja-JP" altLang="en-US" sz="1000" dirty="0">
@@ -5730,7 +5728,7 @@
     </p:spTree>
     <p:extLst>
       <p:ext uri="{BB962C8B-B14F-4D97-AF65-F5344CB8AC3E}">
-        <p14:creationId xmlns:p14="http://schemas.microsoft.com/office/powerpoint/2010/main" val="59902918"/>
+        <p14:creationId xmlns:p14="http://schemas.microsoft.com/office/powerpoint/2010/main" val="3027764622"/>
       </p:ext>
     </p:extLst>
   </p:cSld>
@@ -6782,7 +6780,7 @@
                 <a:ea typeface="游ゴシック"/>
                 <a:cs typeface="Arial"/>
               </a:rPr>
-              <a:t xml:space="preserve">消去の許可を求めてくるので、「I UNDERSTAND, </a:t>
+              <a:t>消去の許可を求めてくるので、「I UNDERSTAND, </a:t>
             </a:r>
             <a:r>
               <a:rPr lang="ja-JP" altLang="en-US" sz="1050" b="1">
@@ -9295,7 +9293,7 @@
         <p:spPr>
           <a:xfrm>
             <a:off x="660400" y="2768600"/>
-            <a:ext cx="3937000" cy="279400"/>
+            <a:ext cx="3937000" cy="398827"/>
           </a:xfrm>
           <a:prstGeom prst="rect">
             <a:avLst/>
@@ -9304,7 +9302,7 @@
         </p:spPr>
         <p:txBody>
           <a:bodyPr vertOverflow="overflow" vert="horz" wrap="square" rtlCol="0" anchor="t">
-            <a:noAutofit/>
+            <a:spAutoFit/>
           </a:bodyPr>
           <a:lstStyle/>
           <a:p>
@@ -9317,15 +9315,108 @@
                 <a:latin typeface="Consolas"/>
                 <a:cs typeface="Consolas"/>
               </a:rPr>
+              <a:t>ssh </a:t>
+            </a:r>
+            <a:r>
+              <a:rPr lang="en-US" altLang="ja-JP" sz="1000">
+                <a:solidFill>
+                  <a:srgbClr val="FFA726"/>
+                </a:solidFill>
+                <a:latin typeface="Consolas"/>
+                <a:cs typeface="Consolas"/>
+              </a:rPr>
+              <a:t>[</a:t>
+            </a:r>
+            <a:r>
+              <a:rPr lang="ja-JP" altLang="en-US" sz="1000">
+                <a:solidFill>
+                  <a:srgbClr val="FFA726"/>
+                </a:solidFill>
+                <a:latin typeface="Consolas"/>
+                <a:ea typeface="游ゴシック"/>
+                <a:cs typeface="Consolas"/>
+              </a:rPr>
+              <a:t>ユーザー名</a:t>
+            </a:r>
+            <a:r>
+              <a:rPr lang="en-US" altLang="ja-JP" sz="1000">
+                <a:solidFill>
+                  <a:srgbClr val="FFA726"/>
+                </a:solidFill>
+                <a:latin typeface="Consolas"/>
+                <a:cs typeface="Consolas"/>
+              </a:rPr>
+              <a:t>]</a:t>
+            </a:r>
+            <a:r>
+              <a:rPr lang="en-US" altLang="ja-JP" sz="1000">
+                <a:solidFill>
+                  <a:srgbClr val="4ADE80"/>
+                </a:solidFill>
+                <a:latin typeface="Consolas"/>
+                <a:cs typeface="Consolas"/>
+              </a:rPr>
+              <a:t>@</a:t>
+            </a:r>
+            <a:r>
+              <a:rPr lang="en-US" altLang="ja-JP" sz="1000">
+                <a:solidFill>
+                  <a:srgbClr val="FFA726"/>
+                </a:solidFill>
+                <a:latin typeface="Consolas"/>
+                <a:cs typeface="Consolas"/>
+              </a:rPr>
+              <a:t>[</a:t>
+            </a:r>
+            <a:r>
+              <a:rPr lang="ja-JP" altLang="en-US" sz="1000">
+                <a:solidFill>
+                  <a:srgbClr val="FFA726"/>
+                </a:solidFill>
+                <a:latin typeface="Consolas"/>
+                <a:ea typeface="游ゴシック"/>
+                <a:cs typeface="Consolas"/>
+              </a:rPr>
+              <a:t>ホスト名</a:t>
+            </a:r>
+            <a:r>
+              <a:rPr lang="en-US" altLang="ja-JP" sz="1000">
+                <a:solidFill>
+                  <a:srgbClr val="FFA726"/>
+                </a:solidFill>
+                <a:latin typeface="Consolas"/>
+                <a:cs typeface="Consolas"/>
+              </a:rPr>
+              <a:t>].local</a:t>
+            </a:r>
+          </a:p>
+          <a:p>
+            <a:pPr algn="l">
+              <a:spcBef>
+                <a:spcPts val="200"/>
+              </a:spcBef>
+            </a:pPr>
+            <a:r>
+              <a:rPr lang="ja-JP" altLang="en-US" sz="825">
+                <a:solidFill>
+                  <a:srgbClr val="BDBDBD"/>
+                </a:solidFill>
+                <a:latin typeface="Arial"/>
+                <a:ea typeface="游ゴシック"/>
+                <a:cs typeface="Arial"/>
+              </a:rPr>
+              <a:t>例：</a:t>
+            </a:r>
+            <a:r>
+              <a:rPr lang="en-US" altLang="ja-JP" sz="825">
+                <a:solidFill>
+                  <a:srgbClr val="BDBDBD"/>
+                </a:solidFill>
+                <a:latin typeface="Consolas"/>
+                <a:cs typeface="Consolas"/>
+              </a:rPr>
               <a:t>ssh pi@raspberrypi.local</a:t>
             </a:r>
-            <a:endParaRPr lang="ja-JP" altLang="en-US" sz="1000">
-              <a:solidFill>
-                <a:srgbClr val="4ADE80"/>
-              </a:solidFill>
-              <a:latin typeface="Consolas"/>
-              <a:cs typeface="Consolas"/>
-            </a:endParaRPr>
           </a:p>
         </p:txBody>
       </p:sp>
@@ -9343,8 +9434,8 @@
         </p:nvSpPr>
         <p:spPr>
           <a:xfrm>
-            <a:off x="863600" y="2362200"/>
-            <a:ext cx="3810000" cy="228600"/>
+            <a:off x="863600" y="3200400"/>
+            <a:ext cx="3810000" cy="607539"/>
           </a:xfrm>
           <a:prstGeom prst="rect">
             <a:avLst/>
@@ -9353,11 +9444,15 @@
         </p:spPr>
         <p:txBody>
           <a:bodyPr vertOverflow="overflow" vert="horz" wrap="square" rtlCol="0" anchor="t">
-            <a:noAutofit/>
+            <a:spAutoFit/>
           </a:bodyPr>
           <a:lstStyle/>
           <a:p>
-            <a:pPr algn="l"/>
+            <a:pPr algn="l">
+              <a:lnSpc>
+                <a:spcPts val="1300"/>
+              </a:lnSpc>
+            </a:pPr>
             <a:r>
               <a:rPr lang="ja-JP" altLang="en-US" sz="900">
                 <a:solidFill>
@@ -9398,13 +9493,66 @@
               </a:rPr>
               <a:t>Enter</a:t>
             </a:r>
-            <a:endParaRPr lang="ja-JP" altLang="en-US" sz="900">
-              <a:solidFill>
-                <a:srgbClr val="737373"/>
-              </a:solidFill>
-              <a:latin typeface="Arial"/>
-              <a:cs typeface="Arial"/>
-            </a:endParaRPr>
+          </a:p>
+          <a:p>
+            <a:pPr algn="l">
+              <a:lnSpc>
+                <a:spcPts val="1300"/>
+              </a:lnSpc>
+              <a:spcBef>
+                <a:spcPts val="100"/>
+              </a:spcBef>
+            </a:pPr>
+            <a:r>
+              <a:rPr lang="en-US" altLang="ja-JP" sz="900" b="1">
+                <a:solidFill>
+                  <a:srgbClr val="C51A4A"/>
+                </a:solidFill>
+                <a:latin typeface="Arial"/>
+                <a:cs typeface="Arial"/>
+              </a:rPr>
+              <a:t>pi</a:t>
+            </a:r>
+            <a:r>
+              <a:rPr lang="ja-JP" altLang="en-US" sz="900">
+                <a:solidFill>
+                  <a:srgbClr val="737373"/>
+                </a:solidFill>
+                <a:latin typeface="Arial"/>
+                <a:cs typeface="Arial"/>
+              </a:rPr>
+              <a:t> = STEP 3-5で設定したユーザー名</a:t>
+            </a:r>
+          </a:p>
+          <a:p>
+            <a:pPr algn="l">
+              <a:lnSpc>
+                <a:spcPts val="1300"/>
+              </a:lnSpc>
+              <a:spcBef>
+                <a:spcPts val="100"/>
+              </a:spcBef>
+            </a:pPr>
+            <a:r>
+              <a:rPr lang="en-US" altLang="ja-JP" sz="900" b="1">
+                <a:solidFill>
+                  <a:srgbClr val="C51A4A"/>
+                </a:solidFill>
+                <a:latin typeface="Arial"/>
+                <a:cs typeface="Arial"/>
+              </a:rPr>
+              <a:t>raspberrypi.local</a:t>
+            </a:r>
+            <a:r>
+              <a:rPr lang="ja-JP" altLang="en-US" sz="900">
+                <a:solidFill>
+                  <a:srgbClr val="737373"/>
+                </a:solidFill>
+                <a:latin typeface="Arial"/>
+                <a:cs typeface="Arial"/>
+              </a:rPr>
+              <a:t> = Raspberry Piのホスト名</a:t>
+            </a:r>
           </a:p>
         </p:txBody>
       </p:sp>
@@ -9422,7 +9570,7 @@
         </p:nvSpPr>
         <p:spPr>
           <a:xfrm>
-            <a:off x="508000" y="3327400"/>
+            <a:off x="508000" y="3835400"/>
             <a:ext cx="4292600" cy="203200"/>
           </a:xfrm>
           <a:prstGeom prst="rect">
@@ -9464,7 +9612,7 @@
         </p:nvSpPr>
         <p:spPr>
           <a:xfrm>
-            <a:off x="508000" y="3556000"/>
+            <a:off x="508000" y="4038600"/>
             <a:ext cx="4292600" cy="355600"/>
           </a:xfrm>
           <a:prstGeom prst="rect">
@@ -9507,7 +9655,7 @@
                 <a:latin typeface="Arial"/>
                 <a:cs typeface="Arial"/>
               </a:rPr>
-              <a:t xml:space="preserve">」
+              <a:t>」
 → </a:t>
             </a:r>
             <a:r>
@@ -9518,7 +9666,7 @@
                 <a:latin typeface="Arial"/>
                 <a:cs typeface="Arial"/>
               </a:rPr>
-              <a:t xml:space="preserve">yes </a:t>
+              <a:t>yes </a:t>
             </a:r>
             <a:r>
               <a:rPr lang="ja-JP" altLang="en-US" sz="825">
@@ -9564,7 +9712,7 @@
         </p:nvSpPr>
         <p:spPr>
           <a:xfrm>
-            <a:off x="508000" y="4013200"/>
+            <a:off x="508000" y="4419600"/>
             <a:ext cx="4292600" cy="203200"/>
           </a:xfrm>
           <a:prstGeom prst="rect">
@@ -9606,7 +9754,7 @@
         </p:nvSpPr>
         <p:spPr>
           <a:xfrm>
-            <a:off x="508000" y="4241800"/>
+            <a:off x="508000" y="4622800"/>
             <a:ext cx="4292600" cy="355600"/>
           </a:xfrm>
           <a:prstGeom prst="rect">
@@ -9675,7 +9823,7 @@
     </p:spTree>
     <p:extLst>
       <p:ext uri="{BB962C8B-B14F-4D97-AF65-F5344CB8AC3E}">
-        <p14:creationId xmlns:p14="http://schemas.microsoft.com/office/powerpoint/2010/main" val="3906839348"/>
+        <p14:creationId xmlns:p14="http://schemas.microsoft.com/office/powerpoint/2010/main" val="1231388668"/>
       </p:ext>
     </p:extLst>
   </p:cSld>
@@ -10284,7 +10432,7 @@
                 <a:latin typeface="Consolas"/>
                 <a:cs typeface="Consolas"/>
               </a:rPr>
-              <a:t xml:space="preserve">  ipv4.method manual \</a:t>
+              <a:t>  ipv4.method manual \</a:t>
             </a:r>
           </a:p>
           <a:p>
@@ -10299,7 +10447,7 @@
                 <a:latin typeface="Consolas"/>
                 <a:cs typeface="Consolas"/>
               </a:rPr>
-              <a:t xml:space="preserve">  ipv4.addresses "192.168.x.x/24" \</a:t>
+              <a:t>  ipv4.addresses "192.168.x.x/24" \</a:t>
             </a:r>
           </a:p>
           <a:p>
@@ -10314,7 +10462,7 @@
                 <a:latin typeface="Consolas"/>
                 <a:cs typeface="Consolas"/>
               </a:rPr>
-              <a:t xml:space="preserve">  ipv4.gateway "192.168.x.1" \</a:t>
+              <a:t>  ipv4.gateway "192.168.x.1" \</a:t>
             </a:r>
           </a:p>
           <a:p>
@@ -10329,7 +10477,7 @@
                 <a:latin typeface="Consolas"/>
                 <a:cs typeface="Consolas"/>
               </a:rPr>
-              <a:t xml:space="preserve">  ipv4.dns "192.168.x.1"</a:t>
+              <a:t>  ipv4.dns "192.168.x.1"</a:t>
             </a:r>
           </a:p>
         </p:txBody>
@@ -10585,7 +10733,7 @@
                 <a:latin typeface="Arial"/>
                 <a:cs typeface="Arial"/>
               </a:rPr>
-              <a:t xml:space="preserve">  manual = 固定IPに設定</a:t>
+              <a:t>  manual = 固定IPに設定</a:t>
             </a:r>
           </a:p>
           <a:p>
@@ -10613,7 +10761,7 @@
                 <a:latin typeface="Arial"/>
                 <a:cs typeface="Arial"/>
               </a:rPr>
-              <a:t xml:space="preserve">  固定IP/サブネット</a:t>
+              <a:t>  固定IP/サブネット</a:t>
             </a:r>
           </a:p>
           <a:p>
@@ -10641,7 +10789,7 @@
                 <a:latin typeface="Arial"/>
                 <a:cs typeface="Arial"/>
               </a:rPr>
-              <a:t xml:space="preserve">  デフォルトゲートウェイ</a:t>
+              <a:t>  デフォルトゲートウェイ</a:t>
             </a:r>
           </a:p>
           <a:p>
@@ -10669,7 +10817,7 @@
                 <a:latin typeface="Arial"/>
                 <a:cs typeface="Arial"/>
               </a:rPr>
-              <a:t xml:space="preserve">  DNSサーバーアドレス</a:t>
+              <a:t>  DNSサーバーアドレス</a:t>
             </a:r>
           </a:p>
         </p:txBody>
@@ -10751,7 +10899,7 @@
                 <a:latin typeface="Arial"/>
                 <a:cs typeface="Arial"/>
               </a:rPr>
-              <a:t xml:space="preserve">各行末の </a:t>
+              <a:t>各行末の </a:t>
             </a:r>
             <a:r>
               <a:rPr lang="en-US" altLang="ja-JP" sz="1000" b="1" dirty="0">
@@ -10771,7 +10919,7 @@
                 <a:latin typeface="Arial"/>
                 <a:cs typeface="Arial"/>
               </a:rPr>
-              <a:t xml:space="preserve"> は「次の行に続く」の意味。</a:t>
+              <a:t> は「次の行に続く」の意味。</a:t>
             </a:r>
           </a:p>
           <a:p>
@@ -11289,7 +11437,7 @@
                 <a:latin typeface="Consolas"/>
                 <a:cs typeface="Consolas"/>
               </a:rPr>
-              <a:t xml:space="preserve">  ipv4.method manual \</a:t>
+              <a:t>  ipv4.method manual \</a:t>
             </a:r>
           </a:p>
           <a:p>
@@ -11304,7 +11452,7 @@
                 <a:latin typeface="Consolas"/>
                 <a:cs typeface="Consolas"/>
               </a:rPr>
-              <a:t xml:space="preserve">  ipv4.addresses "192.168.104.12/24"</a:t>
+              <a:t>  ipv4.addresses "192.168.104.12/24"</a:t>
             </a:r>
           </a:p>
         </p:txBody>
@@ -11758,7 +11906,7 @@
                 <a:latin typeface="Arial"/>
                 <a:cs typeface="Arial"/>
               </a:rPr>
-              <a:t xml:space="preserve">  manual = 固定IPに設定</a:t>
+              <a:t>  manual = 固定IPに設定</a:t>
             </a:r>
           </a:p>
           <a:p>
@@ -11786,7 +11934,7 @@
                 <a:latin typeface="Arial"/>
                 <a:cs typeface="Arial"/>
               </a:rPr>
-              <a:t xml:space="preserve">  固定IP/サブネット</a:t>
+              <a:t>  固定IP/サブネット</a:t>
             </a:r>
           </a:p>
         </p:txBody>
@@ -11906,7 +12054,7 @@
                 <a:latin typeface="Arial"/>
                 <a:cs typeface="Arial"/>
               </a:rPr>
-              <a:t xml:space="preserve"> / </a:t>
+              <a:t> / </a:t>
             </a:r>
             <a:r>
               <a:rPr lang="en-US" altLang="ja-JP" sz="900" dirty="0">
@@ -11926,7 +12074,7 @@
                 <a:latin typeface="Arial"/>
                 <a:cs typeface="Arial"/>
               </a:rPr>
-              <a:t xml:space="preserve"> の設定は不要です。</a:t>
+              <a:t> の設定は不要です。</a:t>
             </a:r>
           </a:p>
           <a:p>
@@ -12563,7 +12711,7 @@
                   <a:srgbClr val="00B050"/>
                 </a:solidFill>
               </a:rPr>
-              <a:t xml:space="preserve"> https://</a:t>
+              <a:t> https://</a:t>
             </a:r>
             <a:r>
               <a:rPr lang="en-US" altLang="ja-JP" sz="1000" dirty="0" err="1">
@@ -12758,7 +12906,7 @@
                 <a:ea typeface="Arial" pitchFamily="34" charset="-122"/>
                 <a:cs typeface="Arial" pitchFamily="34" charset="-120"/>
               </a:rPr>
-              <a:t xml:space="preserve">「Are you sure you want to do this?」→ </a:t>
+              <a:t>「Are you sure you want to do this?」→ </a:t>
             </a:r>
             <a:r>
               <a:rPr lang="en-US" sz="825" b="1">
@@ -12795,7 +12943,7 @@
                 <a:ea typeface="Arial" pitchFamily="34" charset="-122"/>
                 <a:cs typeface="Arial" pitchFamily="34" charset="-120"/>
               </a:rPr>
-              <a:t xml:space="preserve">「Would you like to install Pi-specific nodes?」→ </a:t>
+              <a:t>「Would you like to install Pi-specific nodes?」→ </a:t>
             </a:r>
             <a:r>
               <a:rPr lang="en-US" sz="825" b="1">
@@ -12927,7 +13075,7 @@
                 <a:ea typeface="Arial" pitchFamily="34" charset="-122"/>
                 <a:cs typeface="Arial" pitchFamily="34" charset="-120"/>
               </a:rPr>
-              <a:t xml:space="preserve"> 約10〜20分程度（インターネット速度による）</a:t>
+              <a:t> 約10〜20分程度（インターネット速度による）</a:t>
             </a:r>
             <a:endParaRPr lang="en-US" sz="825"/>
           </a:p>
@@ -13486,7 +13634,7 @@
                   <a:srgbClr val="00B050"/>
                 </a:solidFill>
               </a:rPr>
-              <a:t xml:space="preserve"> </a:t>
+              <a:t> </a:t>
             </a:r>
             <a:r>
               <a:rPr lang="en-US" altLang="ja-JP" sz="1000" err="1">
@@ -13502,7 +13650,7 @@
                   <a:srgbClr val="00B050"/>
                 </a:solidFill>
               </a:rPr>
-              <a:t xml:space="preserve"> enable </a:t>
+              <a:t> enable </a:t>
             </a:r>
             <a:r>
               <a:rPr lang="en-US" altLang="ja-JP" sz="1000" err="1">
@@ -13899,7 +14047,7 @@
                 <a:latin typeface="Arial"/>
                 <a:cs typeface="Arial"/>
               </a:rPr>
-              <a:t xml:space="preserve">systemd </a:t>
+              <a:t>systemd </a:t>
             </a:r>
             <a:r>
               <a:rPr lang="ja-JP" altLang="en-US" sz="950" dirty="0">
@@ -13934,7 +14082,7 @@
                 <a:latin typeface="Arial"/>
                 <a:cs typeface="Arial"/>
               </a:rPr>
-              <a:t xml:space="preserve">systemctl enable </a:t>
+              <a:t>systemctl enable </a:t>
             </a:r>
             <a:r>
               <a:rPr lang="ja-JP" altLang="en-US" sz="950" dirty="0">
@@ -14294,7 +14442,7 @@
                 <a:ea typeface="Arial" pitchFamily="34" charset="-122"/>
                 <a:cs typeface="Arial" pitchFamily="34" charset="-120"/>
               </a:rPr>
-              <a:t xml:space="preserve">Raspberry </a:t>
+              <a:t>Raspberry </a:t>
             </a:r>
             <a:r>
               <a:rPr lang="en-US" sz="975" b="1" err="1">
@@ -17769,7 +17917,7 @@
                 <a:ea typeface="Arial" pitchFamily="34" charset="-122"/>
                 <a:cs typeface="Arial" pitchFamily="34" charset="-120"/>
               </a:rPr>
-              <a:t xml:space="preserve">    users: [{ username: "admin",</a:t>
+              <a:t>    users: [{ username: "admin",</a:t>
             </a:r>
             <a:endParaRPr lang="en-US" sz="825"/>
           </a:p>
@@ -17795,7 +17943,7 @@
                 <a:ea typeface="Arial" pitchFamily="34" charset="-122"/>
                 <a:cs typeface="Arial" pitchFamily="34" charset="-120"/>
               </a:rPr>
-              <a:t xml:space="preserve">    password: "$2b$08$...", permissions: "*" }] },</a:t>
+              <a:t>    password: "$2b$08$...", permissions: "*" }] },</a:t>
             </a:r>
             <a:endParaRPr lang="en-US" sz="825"/>
           </a:p>
@@ -19819,7 +19967,7 @@
                 <a:ea typeface="Arial" pitchFamily="34" charset="-122"/>
                 <a:cs typeface="Arial" pitchFamily="34" charset="-120"/>
               </a:rPr>
-              <a:t xml:space="preserve"> Raspberry Pi OS (64-bit)</a:t>
+              <a:t> Raspberry Pi OS (64-bit)</a:t>
             </a:r>
             <a:endParaRPr lang="en-US" sz="825"/>
           </a:p>
@@ -20768,7 +20916,7 @@
                 <a:ea typeface="Arial" pitchFamily="34" charset="-122"/>
                 <a:cs typeface="Arial" pitchFamily="34" charset="-120"/>
               </a:rPr>
-              <a:t xml:space="preserve">: </a:t>
+              <a:t>: </a:t>
             </a:r>
             <a:r>
               <a:rPr lang="en-US" sz="1350" dirty="0" err="1">
@@ -20790,7 +20938,18 @@
                 <a:ea typeface="Arial" pitchFamily="34" charset="-122"/>
                 <a:cs typeface="Arial" pitchFamily="34" charset="-120"/>
               </a:rPr>
-              <a:t>）</a:t>
+              <a:t>）・・・</a:t>
+            </a:r>
+            <a:r>
+              <a:rPr lang="en-US" sz="1350" dirty="0" err="1">
+                <a:solidFill>
+                  <a:srgbClr val="2E7D32"/>
+                </a:solidFill>
+                <a:latin typeface="Arial" pitchFamily="34" charset="0"/>
+                <a:ea typeface="Arial" pitchFamily="34" charset="-122"/>
+                <a:cs typeface="Arial" pitchFamily="34" charset="-120"/>
+              </a:rPr>
+              <a:t>英数字のみ</a:t>
             </a:r>
             <a:endParaRPr lang="en-US" sz="1350" dirty="0"/>
           </a:p>
@@ -20811,7 +20970,7 @@
                 <a:ea typeface="Arial" pitchFamily="34" charset="-122"/>
                 <a:cs typeface="Arial" pitchFamily="34" charset="-120"/>
               </a:rPr>
-              <a:t>ユーザー名とパスワード</a:t>
+              <a:t>ユーザー名（例：pi）とパスワード</a:t>
             </a:r>
             <a:endParaRPr lang="en-US" sz="1350" dirty="0"/>
           </a:p>
@@ -21315,7 +21474,7 @@
                 <a:ea typeface="Arial" pitchFamily="34" charset="-122"/>
                 <a:cs typeface="Arial"/>
               </a:rPr>
-              <a:t xml:space="preserve">Raspberry Pi </a:t>
+              <a:t>Raspberry Pi </a:t>
             </a:r>
             <a:r>
               <a:rPr lang="ja-JP" altLang="en-US" sz="1050" b="1">
@@ -21599,7 +21758,7 @@
                 <a:ea typeface="Arial" pitchFamily="34" charset="-122"/>
                 <a:cs typeface="Arial"/>
               </a:rPr>
-              <a:t xml:space="preserve">⚠️ </a:t>
+              <a:t>⚠️ </a:t>
             </a:r>
             <a:r>
               <a:rPr lang="ja-JP" altLang="en-US" sz="750">

</xml_diff>